<commit_message>
Phase 2 - Swithch to OpenStreetMap
</commit_message>
<xml_diff>
--- a/lectures3/Pythonlearn-16-Data-Viz.pptx
+++ b/lectures3/Pythonlearn-16-Data-Viz.pptx
@@ -234,10 +234,21 @@
   </p:defaultTextStyle>
   <p:extLst>
     <p:ext uri="{EFAFB233-063F-42B5-8137-9DF3F51BA10A}">
-      <p15:sldGuideLst xmlns="" xmlns:p15="http://schemas.microsoft.com/office/powerpoint/2012/main"/>
+      <p15:sldGuideLst xmlns:p15="http://schemas.microsoft.com/office/powerpoint/2012/main">
+        <p15:guide id="1" orient="horz" pos="1620">
+          <p15:clr>
+            <a:srgbClr val="A4A3A4"/>
+          </p15:clr>
+        </p15:guide>
+        <p15:guide id="2" pos="2880">
+          <p15:clr>
+            <a:srgbClr val="A4A3A4"/>
+          </p15:clr>
+        </p15:guide>
+      </p15:sldGuideLst>
     </p:ext>
     <p:ext uri="{2D200454-40CA-4A62-9FC3-DE9A4176ACB9}">
-      <p15:notesGuideLst xmlns="" xmlns:p15="http://schemas.microsoft.com/office/powerpoint/2012/main"/>
+      <p15:notesGuideLst xmlns:p15="http://schemas.microsoft.com/office/powerpoint/2012/main"/>
     </p:ext>
   </p:extLst>
 </p:presentation>
@@ -563,7 +574,7 @@
               <a:buNone/>
             </a:pPr>
             <a:r>
-              <a:rPr lang="en" sz="1100" b="0" i="0" u="none" strike="noStrike" cap="none" dirty="0" smtClean="0">
+              <a:rPr lang="en" sz="1100" b="0" i="0" u="none" strike="noStrike" cap="none" dirty="0">
                 <a:solidFill>
                   <a:schemeClr val="dk2"/>
                 </a:solidFill>
@@ -575,7 +586,7 @@
               <a:t>Note from Chuck.  If you are using these materials, you can remove the UM logo and replace it with your own, but please retain the CC-BY logo on the first page as well as retain the </a:t>
             </a:r>
             <a:r>
-              <a:rPr lang="en-US" sz="1100" b="0" i="0" u="none" strike="noStrike" cap="none" dirty="0" smtClean="0">
+              <a:rPr lang="en-US" sz="1100" b="0" i="0" u="none" strike="noStrike" cap="none" dirty="0">
                 <a:solidFill>
                   <a:schemeClr val="dk2"/>
                 </a:solidFill>
@@ -587,7 +598,7 @@
               <a:t>acknowledgement </a:t>
             </a:r>
             <a:r>
-              <a:rPr lang="en" sz="1100" b="0" i="0" u="none" strike="noStrike" cap="none" dirty="0" smtClean="0">
+              <a:rPr lang="en" sz="1100" b="0" i="0" u="none" strike="noStrike" cap="none" dirty="0">
                 <a:solidFill>
                   <a:schemeClr val="dk2"/>
                 </a:solidFill>
@@ -599,7 +610,7 @@
               <a:t>page</a:t>
             </a:r>
             <a:r>
-              <a:rPr lang="en-US" sz="1100" b="0" i="0" u="none" strike="noStrike" cap="none" dirty="0" smtClean="0">
+              <a:rPr lang="en-US" sz="1100" b="0" i="0" u="none" strike="noStrike" cap="none" dirty="0">
                 <a:solidFill>
                   <a:schemeClr val="dk2"/>
                 </a:solidFill>
@@ -611,7 +622,7 @@
               <a:t>(s) at the end</a:t>
             </a:r>
             <a:r>
-              <a:rPr lang="en" sz="1100" b="0" i="0" u="none" strike="noStrike" cap="none" smtClean="0">
+              <a:rPr lang="en" sz="1100" b="0" i="0" u="none" strike="noStrike" cap="none">
                 <a:solidFill>
                   <a:schemeClr val="dk2"/>
                 </a:solidFill>
@@ -3684,7 +3695,6 @@
           <a:ln>
             <a:noFill/>
           </a:ln>
-          <a:extLst/>
         </p:spPr>
         <p:txBody>
           <a:bodyPr/>
@@ -3808,7 +3818,7 @@
             <a:pPr eaLnBrk="1" hangingPunct="1">
               <a:defRPr/>
             </a:pPr>
-            <a:endParaRPr lang="en-US" altLang="en-US" sz="2025" smtClean="0"/>
+            <a:endParaRPr lang="en-US" altLang="en-US" sz="2025"/>
           </a:p>
         </p:txBody>
       </p:sp>
@@ -3834,7 +3844,6 @@
           <a:ln>
             <a:noFill/>
           </a:ln>
-          <a:extLst/>
         </p:spPr>
         <p:txBody>
           <a:bodyPr/>
@@ -3958,7 +3967,7 @@
             <a:pPr eaLnBrk="1" hangingPunct="1">
               <a:defRPr/>
             </a:pPr>
-            <a:endParaRPr lang="en-US" altLang="en-US" sz="2025" smtClean="0"/>
+            <a:endParaRPr lang="en-US" altLang="en-US" sz="2025"/>
           </a:p>
         </p:txBody>
       </p:sp>
@@ -4572,7 +4581,7 @@
               <a:buNone/>
             </a:pPr>
             <a:r>
-              <a:rPr lang="en-US" sz="1800" u="none" strike="noStrike" cap="none" dirty="0" smtClean="0">
+              <a:rPr lang="en-US" sz="1800" u="none" strike="noStrike" cap="none" dirty="0">
                 <a:solidFill>
                   <a:srgbClr val="FFFF00"/>
                 </a:solidFill>
@@ -4603,7 +4612,7 @@
               <a:buNone/>
             </a:pPr>
             <a:r>
-              <a:rPr lang="en-US" sz="1800" dirty="0" smtClean="0">
+              <a:rPr lang="en-US" sz="1800" dirty="0">
                 <a:solidFill>
                   <a:srgbClr val="FFFF00"/>
                 </a:solidFill>
@@ -4685,13 +4694,6 @@
   <p:clrMapOvr>
     <a:masterClrMapping/>
   </p:clrMapOvr>
-  <p:timing>
-    <p:tnLst>
-      <p:par>
-        <p:cTn xmlns:p14="http://schemas.microsoft.com/office/powerpoint/2010/main" id="1" dur="indefinite" restart="never" nodeType="tmRoot"/>
-      </p:par>
-    </p:tnLst>
-  </p:timing>
 </p:sld>
 </file>
 
@@ -5025,13 +5027,6 @@
   <p:clrMapOvr>
     <a:masterClrMapping/>
   </p:clrMapOvr>
-  <p:timing>
-    <p:tnLst>
-      <p:par>
-        <p:cTn xmlns:p14="http://schemas.microsoft.com/office/powerpoint/2010/main" id="1" dur="indefinite" restart="never" nodeType="tmRoot"/>
-      </p:par>
-    </p:tnLst>
-  </p:timing>
 </p:sld>
 </file>
 
@@ -5271,13 +5266,6 @@
   <p:clrMapOvr>
     <a:masterClrMapping/>
   </p:clrMapOvr>
-  <p:timing>
-    <p:tnLst>
-      <p:par>
-        <p:cTn xmlns:p14="http://schemas.microsoft.com/office/powerpoint/2010/main" id="1" dur="indefinite" restart="never" nodeType="tmRoot"/>
-      </p:par>
-    </p:tnLst>
-  </p:timing>
 </p:sld>
 </file>
 
@@ -5781,13 +5769,6 @@
   <p:clrMapOvr>
     <a:masterClrMapping/>
   </p:clrMapOvr>
-  <p:timing>
-    <p:tnLst>
-      <p:par>
-        <p:cTn xmlns:p14="http://schemas.microsoft.com/office/powerpoint/2010/main" id="1" dur="indefinite" restart="never" nodeType="tmRoot"/>
-      </p:par>
-    </p:tnLst>
-  </p:timing>
 </p:sld>
 </file>
 
@@ -6073,13 +6054,6 @@
   <p:clrMapOvr>
     <a:masterClrMapping/>
   </p:clrMapOvr>
-  <p:timing>
-    <p:tnLst>
-      <p:par>
-        <p:cTn xmlns:p14="http://schemas.microsoft.com/office/powerpoint/2010/main" id="1" dur="indefinite" restart="never" nodeType="tmRoot"/>
-      </p:par>
-    </p:tnLst>
-  </p:timing>
 </p:sld>
 </file>
 
@@ -6294,13 +6268,6 @@
   <p:clrMapOvr>
     <a:masterClrMapping/>
   </p:clrMapOvr>
-  <p:timing>
-    <p:tnLst>
-      <p:par>
-        <p:cTn xmlns:p14="http://schemas.microsoft.com/office/powerpoint/2010/main" id="1" dur="indefinite" restart="never" nodeType="tmRoot"/>
-      </p:par>
-    </p:tnLst>
-  </p:timing>
 </p:sld>
 </file>
 
@@ -7117,22 +7084,10 @@
                 <a:cs typeface="Helvetica Neue"/>
                 <a:sym typeface="Helvetica Neue"/>
               </a:rPr>
-              <a:t>http://</a:t>
-            </a:r>
-            <a:r>
-              <a:rPr lang="en" sz="2300" b="0" i="0" u="none" strike="noStrike" cap="none" baseline="30000" dirty="0" smtClean="0">
-                <a:solidFill>
-                  <a:srgbClr val="FFFF00"/>
-                </a:solidFill>
-                <a:latin typeface="Helvetica Neue"/>
-                <a:ea typeface="Helvetica Neue"/>
-                <a:cs typeface="Helvetica Neue"/>
-                <a:sym typeface="Helvetica Neue"/>
-              </a:rPr>
-              <a:t>www.py4e.com/code3/</a:t>
-            </a:r>
-            <a:r>
-              <a:rPr lang="en" sz="2300" b="0" i="0" u="none" strike="noStrike" cap="none" baseline="30000" dirty="0" err="1" smtClean="0">
+              <a:t>http://www.py4e.com/code3/</a:t>
+            </a:r>
+            <a:r>
+              <a:rPr lang="en" sz="2300" b="0" i="0" u="none" strike="noStrike" cap="none" baseline="30000" dirty="0" err="1">
                 <a:solidFill>
                   <a:srgbClr val="FFFF00"/>
                 </a:solidFill>
@@ -7422,13 +7377,6 @@
   <p:clrMapOvr>
     <a:masterClrMapping/>
   </p:clrMapOvr>
-  <p:timing>
-    <p:tnLst>
-      <p:par>
-        <p:cTn xmlns:p14="http://schemas.microsoft.com/office/powerpoint/2010/main" id="1" dur="indefinite" restart="never" nodeType="tmRoot"/>
-      </p:par>
-    </p:tnLst>
-  </p:timing>
 </p:sld>
 </file>
 
@@ -7647,22 +7595,10 @@
                 <a:cs typeface="Helvetica Neue"/>
                 <a:sym typeface="Helvetica Neue"/>
               </a:rPr>
-              <a:t>http://</a:t>
-            </a:r>
-            <a:r>
-              <a:rPr lang="en" sz="2300" b="0" i="0" u="none" strike="noStrike" cap="none" baseline="30000" dirty="0" smtClean="0">
-                <a:solidFill>
-                  <a:srgbClr val="FFFF00"/>
-                </a:solidFill>
-                <a:latin typeface="Helvetica Neue"/>
-                <a:ea typeface="Helvetica Neue"/>
-                <a:cs typeface="Helvetica Neue"/>
-                <a:sym typeface="Helvetica Neue"/>
-              </a:rPr>
-              <a:t>www.py4e.com/code3/</a:t>
-            </a:r>
-            <a:r>
-              <a:rPr lang="en" sz="2300" b="0" i="0" u="none" strike="noStrike" cap="none" baseline="30000" dirty="0" err="1" smtClean="0">
+              <a:t>http://www.py4e.com/code3/</a:t>
+            </a:r>
+            <a:r>
+              <a:rPr lang="en" sz="2300" b="0" i="0" u="none" strike="noStrike" cap="none" baseline="30000" dirty="0" err="1">
                 <a:solidFill>
                   <a:srgbClr val="FFFF00"/>
                 </a:solidFill>
@@ -7717,13 +7653,6 @@
   <p:clrMapOvr>
     <a:masterClrMapping/>
   </p:clrMapOvr>
-  <p:timing>
-    <p:tnLst>
-      <p:par>
-        <p:cTn xmlns:p14="http://schemas.microsoft.com/office/powerpoint/2010/main" id="1" dur="indefinite" restart="never" nodeType="tmRoot"/>
-      </p:par>
-    </p:tnLst>
-  </p:timing>
 </p:sld>
 </file>
 
@@ -7846,7 +7775,7 @@
                 </a:solidFill>
                 <a:sym typeface="Cabin"/>
               </a:rPr>
-              <a:t>Do not just point this application at </a:t>
+              <a:t>Sadly the original source of this data (</a:t>
             </a:r>
             <a:r>
               <a:rPr lang="en" sz="2000" u="none" strike="noStrike" cap="none" dirty="0" err="1">
@@ -7860,79 +7789,60 @@
             <a:r>
               <a:rPr lang="en" sz="2000" u="none" strike="noStrike" cap="none" dirty="0">
                 <a:solidFill>
+                  <a:srgbClr val="FFFF00"/>
+                </a:solidFill>
+                <a:sym typeface="Cabin"/>
+              </a:rPr>
+              <a:t>)</a:t>
+            </a:r>
+            <a:r>
+              <a:rPr lang="en" sz="2000" u="none" strike="noStrike" cap="none" dirty="0">
+                <a:solidFill>
                   <a:srgbClr val="FFFFFF"/>
                 </a:solidFill>
                 <a:sym typeface="Cabin"/>
               </a:rPr>
-              <a:t> and let it </a:t>
-            </a:r>
-            <a:r>
-              <a:rPr lang="en" sz="2000" u="none" strike="noStrike" cap="none" dirty="0" smtClean="0">
+              <a:t> </a:t>
+            </a:r>
+            <a:r>
+              <a:rPr lang="en" sz="2000" dirty="0">
                 <a:solidFill>
                   <a:srgbClr val="FFFFFF"/>
                 </a:solidFill>
                 <a:sym typeface="Cabin"/>
               </a:rPr>
-              <a:t>run</a:t>
-            </a:r>
-            <a:endParaRPr lang="en-US" sz="2000" u="none" strike="noStrike" cap="none" dirty="0" smtClean="0">
+              <a:t>has been shut down</a:t>
+            </a:r>
+          </a:p>
+          <a:p>
+            <a:pPr marL="457200" marR="0" lvl="0" indent="-355600" algn="l" rtl="0">
+              <a:lnSpc>
+                <a:spcPct val="115000"/>
+              </a:lnSpc>
+              <a:spcBef>
+                <a:spcPts val="0"/>
+              </a:spcBef>
+              <a:buClr>
+                <a:srgbClr val="FFFFFF"/>
+              </a:buClr>
+              <a:buSzPct val="100000"/>
+              <a:buFont typeface="Cabin"/>
+            </a:pPr>
+            <a:r>
+              <a:rPr lang="en" sz="2000" u="none" strike="noStrike" cap="none" dirty="0">
+                <a:solidFill>
+                  <a:srgbClr val="FFFFFF"/>
+                </a:solidFill>
+                <a:sym typeface="Cabin"/>
+              </a:rPr>
+              <a:t>We made a copy of a subset of the data before it was shut down </a:t>
+            </a:r>
+            <a:endParaRPr lang="en-US" sz="2000" u="none" strike="noStrike" cap="none" dirty="0">
               <a:solidFill>
                 <a:srgbClr val="FFFFFF"/>
               </a:solidFill>
               <a:sym typeface="Cabin"/>
             </a:endParaRPr>
-          </a:p>
-          <a:p>
-            <a:pPr marL="457200" marR="0" lvl="0" indent="-355600" algn="l" rtl="0">
-              <a:lnSpc>
-                <a:spcPct val="115000"/>
-              </a:lnSpc>
-              <a:spcBef>
-                <a:spcPts val="0"/>
-              </a:spcBef>
-              <a:buClr>
-                <a:srgbClr val="FFFFFF"/>
-              </a:buClr>
-              <a:buSzPct val="100000"/>
-              <a:buFont typeface="Cabin"/>
-            </a:pPr>
-            <a:r>
-              <a:rPr lang="en" sz="2000" u="none" strike="noStrike" cap="none" dirty="0" smtClean="0">
-                <a:solidFill>
-                  <a:srgbClr val="FFFFFF"/>
-                </a:solidFill>
-                <a:sym typeface="Cabin"/>
-              </a:rPr>
-              <a:t>There </a:t>
-            </a:r>
-            <a:r>
-              <a:rPr lang="en" sz="2000" u="none" strike="noStrike" cap="none" dirty="0">
-                <a:solidFill>
-                  <a:srgbClr val="FFFFFF"/>
-                </a:solidFill>
-                <a:sym typeface="Cabin"/>
-              </a:rPr>
-              <a:t>is no rate limit – these are cool </a:t>
-            </a:r>
-            <a:r>
-              <a:rPr lang="en" sz="2000" u="none" strike="noStrike" cap="none" dirty="0" smtClean="0">
-                <a:solidFill>
-                  <a:srgbClr val="FFFFFF"/>
-                </a:solidFill>
-                <a:sym typeface="Cabin"/>
-              </a:rPr>
-              <a:t>folk</a:t>
-            </a:r>
-            <a:r>
-              <a:rPr lang="en-US" sz="2000" dirty="0" smtClean="0">
-                <a:solidFill>
-                  <a:srgbClr val="FFFFFF"/>
-                </a:solidFill>
-                <a:sym typeface="Cabin"/>
-              </a:rPr>
-              <a:t>s</a:t>
-            </a:r>
-            <a:endParaRPr lang="en" dirty="0"/>
           </a:p>
         </p:txBody>
       </p:sp>
@@ -7944,7 +7854,7 @@
         </p:nvSpPr>
         <p:spPr>
           <a:xfrm>
-            <a:off x="650081" y="2931949"/>
+            <a:off x="650081" y="3178439"/>
             <a:ext cx="7664937" cy="1028418"/>
           </a:xfrm>
           <a:prstGeom prst="rect">
@@ -7968,7 +7878,7 @@
               <a:buNone/>
             </a:pPr>
             <a:r>
-              <a:rPr lang="en-US" sz="1800" dirty="0" smtClean="0">
+              <a:rPr lang="en-US" sz="1800" dirty="0">
                 <a:solidFill>
                   <a:srgbClr val="FFFF00"/>
                 </a:solidFill>
@@ -7977,19 +7887,7 @@
                 <a:cs typeface="Courier"/>
                 <a:sym typeface="Courier New"/>
               </a:rPr>
-              <a:t>Use this for </a:t>
-            </a:r>
-            <a:r>
-              <a:rPr lang="en-US" sz="1800" smtClean="0">
-                <a:solidFill>
-                  <a:srgbClr val="FFFF00"/>
-                </a:solidFill>
-                <a:latin typeface="Courier"/>
-                <a:ea typeface="Courier New"/>
-                <a:cs typeface="Courier"/>
-                <a:sym typeface="Courier New"/>
-              </a:rPr>
-              <a:t>your testing:</a:t>
+              <a:t>Use this for your testing:</a:t>
             </a:r>
           </a:p>
           <a:p>
@@ -7999,7 +7897,7 @@
               </a:spcBef>
               <a:buNone/>
             </a:pPr>
-            <a:endParaRPr lang="en-US" sz="1800" dirty="0" smtClean="0">
+            <a:endParaRPr lang="en-US" sz="1800" dirty="0">
               <a:solidFill>
                 <a:srgbClr val="FFFF00"/>
               </a:solidFill>
@@ -8017,7 +7915,7 @@
               <a:buNone/>
             </a:pPr>
             <a:r>
-              <a:rPr lang="en" sz="1800" dirty="0" smtClean="0">
+              <a:rPr lang="en" sz="1800" dirty="0">
                 <a:solidFill>
                   <a:srgbClr val="FFFF00"/>
                 </a:solidFill>
@@ -8026,19 +7924,7 @@
                 <a:cs typeface="Courier"/>
                 <a:sym typeface="Courier New"/>
               </a:rPr>
-              <a:t>http</a:t>
-            </a:r>
-            <a:r>
-              <a:rPr lang="en" sz="1800" dirty="0">
-                <a:solidFill>
-                  <a:srgbClr val="FFFF00"/>
-                </a:solidFill>
-                <a:latin typeface="Courier"/>
-                <a:ea typeface="Courier New"/>
-                <a:cs typeface="Courier"/>
-                <a:sym typeface="Courier New"/>
-              </a:rPr>
-              <a:t>://</a:t>
+              <a:t>http://</a:t>
             </a:r>
             <a:r>
               <a:rPr lang="en" sz="1800" dirty="0" err="1">
@@ -8096,13 +7982,6 @@
   <p:clrMapOvr>
     <a:masterClrMapping/>
   </p:clrMapOvr>
-  <p:timing>
-    <p:tnLst>
-      <p:par>
-        <p:cTn xmlns:p14="http://schemas.microsoft.com/office/powerpoint/2010/main" id="1" dur="indefinite" restart="never" nodeType="tmRoot"/>
-      </p:par>
-    </p:tnLst>
-  </p:timing>
 </p:sld>
 </file>
 
@@ -8227,14 +8106,16 @@
         <p:nvCxnSpPr>
           <p:cNvPr id="292" name="Shape 292"/>
           <p:cNvCxnSpPr>
+            <a:cxnSpLocks/>
+            <a:stCxn id="296" idx="3"/>
             <a:endCxn id="291" idx="2"/>
           </p:cNvCxnSpPr>
           <p:nvPr/>
         </p:nvCxnSpPr>
         <p:spPr>
           <a:xfrm>
-            <a:off x="2228834" y="860173"/>
-            <a:ext cx="1618200" cy="3600"/>
+            <a:off x="2146474" y="838887"/>
+            <a:ext cx="1700560" cy="24886"/>
           </a:xfrm>
           <a:prstGeom prst="straightConnector1">
             <a:avLst/>
@@ -8259,7 +8140,7 @@
         </p:nvSpPr>
         <p:spPr>
           <a:xfrm>
-            <a:off x="2199524" y="653778"/>
+            <a:off x="2343611" y="653776"/>
             <a:ext cx="1082100" cy="334799"/>
           </a:xfrm>
           <a:prstGeom prst="rect">
@@ -8302,7 +8183,7 @@
               <a:buNone/>
             </a:pPr>
             <a:r>
-              <a:rPr lang="en" sz="1800" b="0" i="0" u="none" strike="noStrike" cap="none">
+              <a:rPr lang="en" sz="1800" b="0" i="0" u="none" strike="noStrike" cap="none" dirty="0" err="1">
                 <a:solidFill>
                   <a:srgbClr val="FFFFFF"/>
                 </a:solidFill>
@@ -8313,6 +8194,15 @@
               </a:rPr>
               <a:t>gmane.py</a:t>
             </a:r>
+            <a:endParaRPr lang="en" sz="1800" b="0" i="0" u="none" strike="noStrike" cap="none" dirty="0">
+              <a:solidFill>
+                <a:srgbClr val="FFFFFF"/>
+              </a:solidFill>
+              <a:latin typeface="Helvetica Neue"/>
+              <a:ea typeface="Helvetica Neue"/>
+              <a:cs typeface="Helvetica Neue"/>
+              <a:sym typeface="Helvetica Neue"/>
+            </a:endParaRPr>
           </a:p>
         </p:txBody>
       </p:sp>
@@ -8940,22 +8830,10 @@
                 <a:cs typeface="Helvetica Neue"/>
                 <a:sym typeface="Helvetica Neue"/>
               </a:rPr>
-              <a:t>http://</a:t>
-            </a:r>
-            <a:r>
-              <a:rPr lang="en" sz="2300" b="0" i="0" u="none" strike="noStrike" cap="none" baseline="30000" smtClean="0">
-                <a:solidFill>
-                  <a:srgbClr val="FFFF00"/>
-                </a:solidFill>
-                <a:latin typeface="Helvetica Neue"/>
-                <a:ea typeface="Helvetica Neue"/>
-                <a:cs typeface="Helvetica Neue"/>
-                <a:sym typeface="Helvetica Neue"/>
-              </a:rPr>
-              <a:t>www.py4e.com/code3/</a:t>
-            </a:r>
-            <a:r>
-              <a:rPr lang="en" sz="2300" b="0" i="0" u="none" strike="noStrike" cap="none" baseline="30000" dirty="0" err="1" smtClean="0">
+              <a:t>http://www.py4e.com/code3/</a:t>
+            </a:r>
+            <a:r>
+              <a:rPr lang="en" sz="2300" b="0" i="0" u="none" strike="noStrike" cap="none" baseline="30000" dirty="0" err="1">
                 <a:solidFill>
                   <a:srgbClr val="FFFF00"/>
                 </a:solidFill>
@@ -9641,7 +9519,7 @@
               <a:buNone/>
             </a:pPr>
             <a:r>
-              <a:rPr lang="en-US" sz="1500" u="none" strike="noStrike" cap="none" dirty="0" smtClean="0">
+              <a:rPr lang="en-US" sz="1500" u="none" strike="noStrike" cap="none" dirty="0">
                 <a:solidFill>
                   <a:srgbClr val="660066"/>
                 </a:solidFill>
@@ -9653,7 +9531,7 @@
               <a:t>mapping</a:t>
             </a:r>
             <a:r>
-              <a:rPr lang="en" sz="1500" u="none" strike="noStrike" cap="none" dirty="0" smtClean="0">
+              <a:rPr lang="en" sz="1500" u="none" strike="noStrike" cap="none" dirty="0">
                 <a:solidFill>
                   <a:srgbClr val="660066"/>
                 </a:solidFill>
@@ -9665,7 +9543,7 @@
               <a:t>.</a:t>
             </a:r>
             <a:r>
-              <a:rPr lang="en" sz="1500" u="none" strike="noStrike" cap="none" dirty="0" err="1" smtClean="0">
+              <a:rPr lang="en" sz="1500" u="none" strike="noStrike" cap="none" dirty="0" err="1">
                 <a:solidFill>
                   <a:srgbClr val="660066"/>
                 </a:solidFill>
@@ -9831,7 +9709,7 @@
               <a:buNone/>
             </a:pPr>
             <a:r>
-              <a:rPr lang="en" sz="1000" b="0" i="0" u="none" strike="noStrike" cap="none" dirty="0" err="1" smtClean="0">
+              <a:rPr lang="en" sz="1000" b="0" i="0" u="none" strike="noStrike" cap="none" dirty="0" err="1">
                 <a:solidFill>
                   <a:srgbClr val="FFFFFF"/>
                 </a:solidFill>
@@ -9843,7 +9721,7 @@
               <a:t>Thes</a:t>
             </a:r>
             <a:r>
-              <a:rPr lang="en-US" sz="1000" b="0" i="0" u="none" strike="noStrike" cap="none" dirty="0" smtClean="0">
+              <a:rPr lang="en-US" sz="1000" b="0" i="0" u="none" strike="noStrike" cap="none" dirty="0">
                 <a:solidFill>
                   <a:srgbClr val="FFFFFF"/>
                 </a:solidFill>
@@ -9855,7 +9733,7 @@
               <a:t>e</a:t>
             </a:r>
             <a:r>
-              <a:rPr lang="en" sz="1000" b="0" i="0" u="none" strike="noStrike" cap="none" dirty="0" smtClean="0">
+              <a:rPr lang="en" sz="1000" b="0" i="0" u="none" strike="noStrike" cap="none" dirty="0">
                 <a:solidFill>
                   <a:srgbClr val="FFFFFF"/>
                 </a:solidFill>
@@ -9867,7 +9745,7 @@
               <a:t> slide</a:t>
             </a:r>
             <a:r>
-              <a:rPr lang="en-US" sz="1000" b="0" i="0" u="none" strike="noStrike" cap="none" smtClean="0">
+              <a:rPr lang="en-US" sz="1000" b="0" i="0" u="none" strike="noStrike" cap="none">
                 <a:solidFill>
                   <a:srgbClr val="FFFFFF"/>
                 </a:solidFill>
@@ -9879,7 +9757,7 @@
               <a:t>s</a:t>
             </a:r>
             <a:r>
-              <a:rPr lang="en" sz="1000" b="0" i="0" u="none" strike="noStrike" cap="none" smtClean="0">
+              <a:rPr lang="en" sz="1000" b="0" i="0" u="none" strike="noStrike" cap="none">
                 <a:solidFill>
                   <a:srgbClr val="FFFFFF"/>
                 </a:solidFill>
@@ -10325,33 +10203,6 @@
           </a:p>
         </p:txBody>
       </p:sp>
-      <p:pic>
-        <p:nvPicPr>
-          <p:cNvPr id="130" name="Shape 130" descr="google-map.png"/>
-          <p:cNvPicPr preferRelativeResize="0"/>
-          <p:nvPr/>
-        </p:nvPicPr>
-        <p:blipFill rotWithShape="1">
-          <a:blip r:embed="rId5">
-            <a:alphaModFix/>
-          </a:blip>
-          <a:srcRect/>
-          <a:stretch/>
-        </p:blipFill>
-        <p:spPr>
-          <a:xfrm>
-            <a:off x="7024687" y="1365678"/>
-            <a:ext cx="1857375" cy="1335419"/>
-          </a:xfrm>
-          <a:prstGeom prst="rect">
-            <a:avLst/>
-          </a:prstGeom>
-          <a:noFill/>
-          <a:ln>
-            <a:noFill/>
-          </a:ln>
-        </p:spPr>
-      </p:pic>
       <p:sp>
         <p:nvSpPr>
           <p:cNvPr id="131" name="Shape 131"/>
@@ -10507,15 +10358,16 @@
         <p:nvCxnSpPr>
           <p:cNvPr id="134" name="Shape 134"/>
           <p:cNvCxnSpPr>
+            <a:cxnSpLocks/>
             <a:stCxn id="131" idx="4"/>
-            <a:endCxn id="130" idx="1"/>
+            <a:endCxn id="4" idx="1"/>
           </p:cNvCxnSpPr>
           <p:nvPr/>
         </p:nvCxnSpPr>
         <p:spPr>
-          <a:xfrm rot="10800000" flipH="1">
-            <a:off x="5016590" y="2033537"/>
-            <a:ext cx="2008199" cy="2059800"/>
+          <a:xfrm flipV="1">
+            <a:off x="5016590" y="2264137"/>
+            <a:ext cx="1930302" cy="1829200"/>
           </a:xfrm>
           <a:prstGeom prst="straightConnector1">
             <a:avLst/>
@@ -10627,7 +10479,7 @@
         </p:nvSpPr>
         <p:spPr>
           <a:xfrm>
-            <a:off x="5572692" y="2674040"/>
+            <a:off x="5500708" y="2963873"/>
             <a:ext cx="1096961" cy="369331"/>
           </a:xfrm>
           <a:prstGeom prst="rect">
@@ -10664,7 +10516,7 @@
               <a:buNone/>
             </a:pPr>
             <a:r>
-              <a:rPr lang="en" sz="2000" b="0" i="0" u="none" strike="noStrike" cap="none">
+              <a:rPr lang="en" sz="2000" b="0" i="0" u="none" strike="noStrike" cap="none" dirty="0">
                 <a:solidFill>
                   <a:srgbClr val="FFFFFF"/>
                 </a:solidFill>
@@ -10956,18 +10808,41 @@
           </a:p>
         </p:txBody>
       </p:sp>
+      <p:pic>
+        <p:nvPicPr>
+          <p:cNvPr id="4" name="Picture 3" descr="A map of europe with red points&#10;&#10;Description automatically generated">
+            <a:extLst>
+              <a:ext uri="{FF2B5EF4-FFF2-40B4-BE49-F238E27FC236}">
+                <a16:creationId xmlns:a16="http://schemas.microsoft.com/office/drawing/2014/main" id="{91F51BF1-2786-90E8-4B3F-8A44A8587F49}"/>
+              </a:ext>
+            </a:extLst>
+          </p:cNvPr>
+          <p:cNvPicPr>
+            <a:picLocks noChangeAspect="1"/>
+          </p:cNvPicPr>
+          <p:nvPr/>
+        </p:nvPicPr>
+        <p:blipFill>
+          <a:blip r:embed="rId5"/>
+          <a:stretch>
+            <a:fillRect/>
+          </a:stretch>
+        </p:blipFill>
+        <p:spPr>
+          <a:xfrm>
+            <a:off x="6946892" y="1590570"/>
+            <a:ext cx="1901442" cy="1347134"/>
+          </a:xfrm>
+          <a:prstGeom prst="rect">
+            <a:avLst/>
+          </a:prstGeom>
+        </p:spPr>
+      </p:pic>
     </p:spTree>
   </p:cSld>
   <p:clrMapOvr>
     <a:masterClrMapping/>
   </p:clrMapOvr>
-  <p:timing>
-    <p:tnLst>
-      <p:par>
-        <p:cTn xmlns:p14="http://schemas.microsoft.com/office/powerpoint/2010/main" id="1" dur="indefinite" restart="never" nodeType="tmRoot"/>
-      </p:par>
-    </p:tnLst>
-  </p:timing>
 </p:sld>
 </file>
 
@@ -11172,13 +11047,6 @@
   <p:clrMapOvr>
     <a:masterClrMapping/>
   </p:clrMapOvr>
-  <p:timing>
-    <p:tnLst>
-      <p:par>
-        <p:cTn xmlns:p14="http://schemas.microsoft.com/office/powerpoint/2010/main" id="1" dur="indefinite" restart="never" nodeType="tmRoot"/>
-      </p:par>
-    </p:tnLst>
-  </p:timing>
 </p:sld>
 </file>
 
@@ -11299,13 +11167,6 @@
   <p:clrMapOvr>
     <a:masterClrMapping/>
   </p:clrMapOvr>
-  <p:timing>
-    <p:tnLst>
-      <p:par>
-        <p:cTn xmlns:p14="http://schemas.microsoft.com/office/powerpoint/2010/main" id="1" dur="indefinite" restart="never" nodeType="tmRoot"/>
-      </p:par>
-    </p:tnLst>
-  </p:timing>
 </p:sld>
 </file>
 
@@ -11351,22 +11212,24 @@
           </a:bodyPr>
           <a:lstStyle/>
           <a:p>
-            <a:pPr marL="0" marR="0" lvl="0" indent="0" algn="ctr" rtl="0">
-              <a:spcBef>
-                <a:spcPts val="0"/>
-              </a:spcBef>
+            <a:pPr lvl="0">
               <a:buSzPct val="25000"/>
-              <a:buNone/>
-            </a:pPr>
-            <a:r>
-              <a:rPr lang="en" sz="4300" u="none" strike="noStrike" cap="none">
+            </a:pPr>
+            <a:r>
+              <a:rPr lang="en" sz="4300" u="none" strike="noStrike" cap="none" dirty="0" err="1">
                 <a:solidFill>
                   <a:srgbClr val="FFD966"/>
                 </a:solidFill>
                 <a:sym typeface="Cabin"/>
               </a:rPr>
-              <a:t>GeoData</a:t>
-            </a:r>
+              <a:t>OpenGeo</a:t>
+            </a:r>
+            <a:endParaRPr lang="en" sz="4300" u="none" strike="noStrike" cap="none" dirty="0">
+              <a:solidFill>
+                <a:srgbClr val="FFD966"/>
+              </a:solidFill>
+              <a:sym typeface="Cabin"/>
+            </a:endParaRPr>
           </a:p>
         </p:txBody>
       </p:sp>
@@ -11382,8 +11245,8 @@
         </p:nvSpPr>
         <p:spPr>
           <a:xfrm>
-            <a:off x="650081" y="1464469"/>
-            <a:ext cx="4218698" cy="3207599"/>
+            <a:off x="650080" y="1464469"/>
+            <a:ext cx="4335387" cy="3207599"/>
           </a:xfrm>
           <a:prstGeom prst="rect">
             <a:avLst/>
@@ -11416,7 +11279,7 @@
                 </a:solidFill>
                 <a:sym typeface="Cabin"/>
               </a:rPr>
-              <a:t>Makes a Google Map from user entered data</a:t>
+              <a:t>Makes an annotated Open Street Map from user entered data</a:t>
             </a:r>
           </a:p>
           <a:p>
@@ -11437,7 +11300,7 @@
                 </a:solidFill>
                 <a:sym typeface="Cabin"/>
               </a:rPr>
-              <a:t>Uses the Google </a:t>
+              <a:t>Uses the proxied </a:t>
             </a:r>
             <a:r>
               <a:rPr lang="en" sz="2000" u="none" strike="noStrike" cap="none" dirty="0" err="1">
@@ -11446,7 +11309,7 @@
                 </a:solidFill>
                 <a:sym typeface="Cabin"/>
               </a:rPr>
-              <a:t>Geodata</a:t>
+              <a:t>GeoAPI</a:t>
             </a:r>
             <a:r>
               <a:rPr lang="en" sz="2000" u="none" strike="noStrike" cap="none" dirty="0">
@@ -11497,38 +11360,11 @@
                 </a:solidFill>
                 <a:sym typeface="Cabin"/>
               </a:rPr>
-              <a:t>Visualized in a browser using the Google Maps API</a:t>
+              <a:t>Visualized in a browser using the Open Street Map</a:t>
             </a:r>
           </a:p>
         </p:txBody>
       </p:sp>
-      <p:pic>
-        <p:nvPicPr>
-          <p:cNvPr id="159" name="Shape 159" descr="google-map.png"/>
-          <p:cNvPicPr preferRelativeResize="0"/>
-          <p:nvPr/>
-        </p:nvPicPr>
-        <p:blipFill rotWithShape="1">
-          <a:blip r:embed="rId3">
-            <a:alphaModFix/>
-          </a:blip>
-          <a:srcRect/>
-          <a:stretch/>
-        </p:blipFill>
-        <p:spPr>
-          <a:xfrm>
-            <a:off x="5132195" y="1706398"/>
-            <a:ext cx="3598415" cy="2587196"/>
-          </a:xfrm>
-          <a:prstGeom prst="rect">
-            <a:avLst/>
-          </a:prstGeom>
-          <a:noFill/>
-          <a:ln>
-            <a:noFill/>
-          </a:ln>
-        </p:spPr>
-      </p:pic>
       <p:sp>
         <p:nvSpPr>
           <p:cNvPr id="160" name="Shape 160"/>
@@ -11537,8 +11373,8 @@
         </p:nvSpPr>
         <p:spPr>
           <a:xfrm>
-            <a:off x="5043499" y="4574897"/>
-            <a:ext cx="3717348" cy="282769"/>
+            <a:off x="4868779" y="4574897"/>
+            <a:ext cx="3892068" cy="282769"/>
           </a:xfrm>
           <a:prstGeom prst="rect">
             <a:avLst/>
@@ -11571,10 +11407,10 @@
                 <a:cs typeface="Helvetica Neue"/>
                 <a:sym typeface="Helvetica Neue"/>
               </a:rPr>
-              <a:t>http://</a:t>
-            </a:r>
-            <a:r>
-              <a:rPr lang="en" sz="2300" b="0" i="0" u="none" strike="noStrike" cap="none" baseline="30000" dirty="0" smtClean="0">
+              <a:t>http://www.py4e.com/code3/</a:t>
+            </a:r>
+            <a:r>
+              <a:rPr lang="en" sz="2300" b="0" i="0" u="none" strike="noStrike" cap="none" baseline="30000" dirty="0" err="1">
                 <a:solidFill>
                   <a:srgbClr val="FFFF00"/>
                 </a:solidFill>
@@ -11583,19 +11419,7 @@
                 <a:cs typeface="Helvetica Neue"/>
                 <a:sym typeface="Helvetica Neue"/>
               </a:rPr>
-              <a:t>www.py4e.com/code3/</a:t>
-            </a:r>
-            <a:r>
-              <a:rPr lang="en" sz="2300" b="0" i="0" u="none" strike="noStrike" cap="none" baseline="30000" dirty="0" err="1" smtClean="0">
-                <a:solidFill>
-                  <a:srgbClr val="FFFF00"/>
-                </a:solidFill>
-                <a:latin typeface="Helvetica Neue"/>
-                <a:ea typeface="Helvetica Neue"/>
-                <a:cs typeface="Helvetica Neue"/>
-                <a:sym typeface="Helvetica Neue"/>
-              </a:rPr>
-              <a:t>geodata.zip</a:t>
+              <a:t>opengeo.zip</a:t>
             </a:r>
             <a:endParaRPr lang="en" sz="2300" b="0" i="0" u="none" strike="noStrike" cap="none" baseline="30000" dirty="0">
               <a:solidFill>
@@ -11609,18 +11433,41 @@
           </a:p>
         </p:txBody>
       </p:sp>
+      <p:pic>
+        <p:nvPicPr>
+          <p:cNvPr id="4" name="Picture 3" descr="A map of europe with red points&#10;&#10;Description automatically generated">
+            <a:extLst>
+              <a:ext uri="{FF2B5EF4-FFF2-40B4-BE49-F238E27FC236}">
+                <a16:creationId xmlns:a16="http://schemas.microsoft.com/office/drawing/2014/main" id="{AAB44B88-3681-4317-F642-D27274FFC661}"/>
+              </a:ext>
+            </a:extLst>
+          </p:cNvPr>
+          <p:cNvPicPr>
+            <a:picLocks noChangeAspect="1"/>
+          </p:cNvPicPr>
+          <p:nvPr/>
+        </p:nvPicPr>
+        <p:blipFill>
+          <a:blip r:embed="rId3"/>
+          <a:stretch>
+            <a:fillRect/>
+          </a:stretch>
+        </p:blipFill>
+        <p:spPr>
+          <a:xfrm>
+            <a:off x="5225590" y="1606162"/>
+            <a:ext cx="3535257" cy="2504661"/>
+          </a:xfrm>
+          <a:prstGeom prst="rect">
+            <a:avLst/>
+          </a:prstGeom>
+        </p:spPr>
+      </p:pic>
     </p:spTree>
   </p:cSld>
   <p:clrMapOvr>
     <a:masterClrMapping/>
   </p:clrMapOvr>
-  <p:timing>
-    <p:tnLst>
-      <p:par>
-        <p:cTn xmlns:p14="http://schemas.microsoft.com/office/powerpoint/2010/main" id="1" dur="indefinite" restart="never" nodeType="tmRoot"/>
-      </p:par>
-    </p:tnLst>
-  </p:timing>
 </p:sld>
 </file>
 
@@ -11705,33 +11552,6 @@
           </a:p>
         </p:txBody>
       </p:sp>
-      <p:pic>
-        <p:nvPicPr>
-          <p:cNvPr id="166" name="Shape 166" descr="google-map.png"/>
-          <p:cNvPicPr preferRelativeResize="0"/>
-          <p:nvPr/>
-        </p:nvPicPr>
-        <p:blipFill rotWithShape="1">
-          <a:blip r:embed="rId4">
-            <a:alphaModFix/>
-          </a:blip>
-          <a:srcRect/>
-          <a:stretch/>
-        </p:blipFill>
-        <p:spPr>
-          <a:xfrm>
-            <a:off x="7119832" y="1567420"/>
-            <a:ext cx="1857375" cy="1335419"/>
-          </a:xfrm>
-          <a:prstGeom prst="rect">
-            <a:avLst/>
-          </a:prstGeom>
-          <a:noFill/>
-          <a:ln>
-            <a:noFill/>
-          </a:ln>
-        </p:spPr>
-      </p:pic>
       <p:cxnSp>
         <p:nvCxnSpPr>
           <p:cNvPr id="167" name="Shape 167"/>
@@ -11971,7 +11791,7 @@
               <a:buNone/>
             </a:pPr>
             <a:r>
-              <a:rPr lang="en" sz="1000" b="0" i="0" u="none" strike="noStrike" cap="none">
+              <a:rPr lang="en" sz="1000" b="0" i="0" u="none" strike="noStrike" cap="none" dirty="0">
                 <a:solidFill>
                   <a:srgbClr val="FFFFFF"/>
                 </a:solidFill>
@@ -11992,7 +11812,7 @@
               <a:buNone/>
             </a:pPr>
             <a:r>
-              <a:rPr lang="en" sz="1000" b="0" i="0" u="none" strike="noStrike" cap="none">
+              <a:rPr lang="en" sz="1000" b="0" i="0" u="none" strike="noStrike" cap="none" dirty="0">
                 <a:solidFill>
                   <a:srgbClr val="FFFFFF"/>
                 </a:solidFill>
@@ -12013,7 +11833,7 @@
               <a:buNone/>
             </a:pPr>
             <a:r>
-              <a:rPr lang="en" sz="1000" b="0" i="0" u="none" strike="noStrike" cap="none">
+              <a:rPr lang="en" sz="1000" b="0" i="0" u="none" strike="noStrike" cap="none" dirty="0">
                 <a:solidFill>
                   <a:srgbClr val="FFFFFF"/>
                 </a:solidFill>
@@ -12034,7 +11854,7 @@
               <a:buNone/>
             </a:pPr>
             <a:r>
-              <a:rPr lang="en" sz="1000" b="0" i="0" u="none" strike="noStrike" cap="none">
+              <a:rPr lang="en" sz="1000" b="0" i="0" u="none" strike="noStrike" cap="none" dirty="0">
                 <a:solidFill>
                   <a:srgbClr val="FFFFFF"/>
                 </a:solidFill>
@@ -12043,19 +11863,10 @@
                 <a:cs typeface="Helvetica Neue"/>
                 <a:sym typeface="Helvetica Neue"/>
               </a:rPr>
-              <a:t>Technion, Viazman 87, Kesalsaba, 32000, Israel 32.7775 35.0216667</a:t>
-            </a:r>
-          </a:p>
-          <a:p>
-            <a:pPr marL="0" marR="0" lvl="0" indent="0" algn="l" rtl="0">
-              <a:spcBef>
-                <a:spcPts val="0"/>
-              </a:spcBef>
-              <a:buSzPct val="25000"/>
-              <a:buNone/>
-            </a:pPr>
-            <a:r>
-              <a:rPr lang="en" sz="1000" b="0" i="0" u="none" strike="noStrike" cap="none">
+              <a:t>Technion, </a:t>
+            </a:r>
+            <a:r>
+              <a:rPr lang="en" sz="1000" b="0" i="0" u="none" strike="noStrike" cap="none" dirty="0" err="1">
                 <a:solidFill>
                   <a:srgbClr val="FFFFFF"/>
                 </a:solidFill>
@@ -12064,19 +11875,10 @@
                 <a:cs typeface="Helvetica Neue"/>
                 <a:sym typeface="Helvetica Neue"/>
               </a:rPr>
-              <a:t>Monash University Clayton ... VIC 3800, Australia -37.9152113 145.134682 </a:t>
-            </a:r>
-          </a:p>
-          <a:p>
-            <a:pPr marL="0" marR="0" lvl="0" indent="0" algn="l" rtl="0">
-              <a:spcBef>
-                <a:spcPts val="0"/>
-              </a:spcBef>
-              <a:buSzPct val="25000"/>
-              <a:buNone/>
-            </a:pPr>
-            <a:r>
-              <a:rPr lang="en" sz="1000" b="0" i="0" u="none" strike="noStrike" cap="none">
+              <a:t>Viazman</a:t>
+            </a:r>
+            <a:r>
+              <a:rPr lang="en" sz="1000" b="0" i="0" u="none" strike="noStrike" cap="none" dirty="0">
                 <a:solidFill>
                   <a:srgbClr val="FFFFFF"/>
                 </a:solidFill>
@@ -12085,19 +11887,10 @@
                 <a:cs typeface="Helvetica Neue"/>
                 <a:sym typeface="Helvetica Neue"/>
               </a:rPr>
-              <a:t>Kokshetau, Kazakhstan 53.2833333 69.3833333</a:t>
-            </a:r>
-          </a:p>
-          <a:p>
-            <a:pPr marL="0" marR="0" lvl="0" indent="0" algn="l" rtl="0">
-              <a:spcBef>
-                <a:spcPts val="0"/>
-              </a:spcBef>
-              <a:buSzPct val="25000"/>
-              <a:buNone/>
-            </a:pPr>
-            <a:r>
-              <a:rPr lang="en" sz="1000" b="0" i="0" u="none" strike="noStrike" cap="none">
+              <a:t> 87, </a:t>
+            </a:r>
+            <a:r>
+              <a:rPr lang="en" sz="1000" b="0" i="0" u="none" strike="noStrike" cap="none" dirty="0" err="1">
                 <a:solidFill>
                   <a:srgbClr val="FFFFFF"/>
                 </a:solidFill>
@@ -12106,19 +11899,10 @@
                 <a:cs typeface="Helvetica Neue"/>
                 <a:sym typeface="Helvetica Neue"/>
               </a:rPr>
-              <a:t>...</a:t>
-            </a:r>
-          </a:p>
-          <a:p>
-            <a:pPr marL="0" marR="0" lvl="0" indent="0" algn="l" rtl="0">
-              <a:spcBef>
-                <a:spcPts val="0"/>
-              </a:spcBef>
-              <a:buSzPct val="25000"/>
-              <a:buNone/>
-            </a:pPr>
-            <a:r>
-              <a:rPr lang="en" sz="1000" b="0" i="0" u="none" strike="noStrike" cap="none">
+              <a:t>Kesalsaba</a:t>
+            </a:r>
+            <a:r>
+              <a:rPr lang="en" sz="1000" b="0" i="0" u="none" strike="noStrike" cap="none" dirty="0">
                 <a:solidFill>
                   <a:srgbClr val="FFFFFF"/>
                 </a:solidFill>
@@ -12127,7 +11911,7 @@
                 <a:cs typeface="Helvetica Neue"/>
                 <a:sym typeface="Helvetica Neue"/>
               </a:rPr>
-              <a:t>12 records written to where.js</a:t>
+              <a:t>, 32000, Israel 32.7775 35.0216667</a:t>
             </a:r>
           </a:p>
           <a:p>
@@ -12139,7 +11923,7 @@
               <a:buNone/>
             </a:pPr>
             <a:r>
-              <a:rPr lang="en" sz="1000" b="0" i="0" u="none" strike="noStrike" cap="none">
+              <a:rPr lang="en" sz="1000" b="0" i="0" u="none" strike="noStrike" cap="none" dirty="0" err="1">
                 <a:solidFill>
                   <a:srgbClr val="FFFFFF"/>
                 </a:solidFill>
@@ -12148,8 +11932,158 @@
                 <a:cs typeface="Helvetica Neue"/>
                 <a:sym typeface="Helvetica Neue"/>
               </a:rPr>
-              <a:t>Open where.html to view the data in a browser</a:t>
-            </a:r>
+              <a:t>Kokshetau</a:t>
+            </a:r>
+            <a:r>
+              <a:rPr lang="en" sz="1000" b="0" i="0" u="none" strike="noStrike" cap="none" dirty="0">
+                <a:solidFill>
+                  <a:srgbClr val="FFFFFF"/>
+                </a:solidFill>
+                <a:latin typeface="Helvetica Neue"/>
+                <a:ea typeface="Helvetica Neue"/>
+                <a:cs typeface="Helvetica Neue"/>
+                <a:sym typeface="Helvetica Neue"/>
+              </a:rPr>
+              <a:t>, Kazakhstan 53.2833333 69.3833333</a:t>
+            </a:r>
+          </a:p>
+          <a:p>
+            <a:pPr marL="0" marR="0" lvl="0" indent="0" algn="l" rtl="0">
+              <a:spcBef>
+                <a:spcPts val="0"/>
+              </a:spcBef>
+              <a:buSzPct val="25000"/>
+              <a:buNone/>
+            </a:pPr>
+            <a:r>
+              <a:rPr lang="en" sz="1000" b="0" i="0" u="none" strike="noStrike" cap="none" dirty="0">
+                <a:solidFill>
+                  <a:srgbClr val="FFFFFF"/>
+                </a:solidFill>
+                <a:latin typeface="Helvetica Neue"/>
+                <a:ea typeface="Helvetica Neue"/>
+                <a:cs typeface="Helvetica Neue"/>
+                <a:sym typeface="Helvetica Neue"/>
+              </a:rPr>
+              <a:t>...</a:t>
+            </a:r>
+          </a:p>
+          <a:p>
+            <a:pPr marL="0" marR="0" lvl="0" indent="0" algn="l" rtl="0">
+              <a:spcBef>
+                <a:spcPts val="0"/>
+              </a:spcBef>
+              <a:buSzPct val="25000"/>
+              <a:buNone/>
+            </a:pPr>
+            <a:r>
+              <a:rPr lang="en-US" sz="1000" b="0" i="0" u="none" strike="noStrike" cap="none" dirty="0">
+                <a:solidFill>
+                  <a:srgbClr val="FFFFFF"/>
+                </a:solidFill>
+                <a:latin typeface="Helvetica Neue"/>
+                <a:ea typeface="Helvetica Neue"/>
+                <a:cs typeface="Helvetica Neue"/>
+                <a:sym typeface="Helvetica Neue"/>
+              </a:rPr>
+              <a:t>Technical University Munich 48.14907275 11.567444920339295</a:t>
+            </a:r>
+          </a:p>
+          <a:p>
+            <a:pPr marL="0" marR="0" lvl="0" indent="0" algn="l" rtl="0">
+              <a:spcBef>
+                <a:spcPts val="0"/>
+              </a:spcBef>
+              <a:buSzPct val="25000"/>
+              <a:buNone/>
+            </a:pPr>
+            <a:r>
+              <a:rPr lang="en-US" sz="1000" b="0" i="0" u="none" strike="noStrike" cap="none" dirty="0">
+                <a:solidFill>
+                  <a:srgbClr val="FFFFFF"/>
+                </a:solidFill>
+                <a:latin typeface="Helvetica Neue"/>
+                <a:ea typeface="Helvetica Neue"/>
+                <a:cs typeface="Helvetica Neue"/>
+                <a:sym typeface="Helvetica Neue"/>
+              </a:rPr>
+              <a:t>178 records written to </a:t>
+            </a:r>
+            <a:r>
+              <a:rPr lang="en-US" sz="1000" b="0" i="0" u="none" strike="noStrike" cap="none" dirty="0" err="1">
+                <a:solidFill>
+                  <a:srgbClr val="FFFFFF"/>
+                </a:solidFill>
+                <a:latin typeface="Helvetica Neue"/>
+                <a:ea typeface="Helvetica Neue"/>
+                <a:cs typeface="Helvetica Neue"/>
+                <a:sym typeface="Helvetica Neue"/>
+              </a:rPr>
+              <a:t>where.js</a:t>
+            </a:r>
+            <a:endParaRPr lang="en-US" sz="1000" b="0" i="0" u="none" strike="noStrike" cap="none" dirty="0">
+              <a:solidFill>
+                <a:srgbClr val="FFFFFF"/>
+              </a:solidFill>
+              <a:latin typeface="Helvetica Neue"/>
+              <a:ea typeface="Helvetica Neue"/>
+              <a:cs typeface="Helvetica Neue"/>
+              <a:sym typeface="Helvetica Neue"/>
+            </a:endParaRPr>
+          </a:p>
+          <a:p>
+            <a:pPr marL="0" marR="0" lvl="0" indent="0" algn="l" rtl="0">
+              <a:spcBef>
+                <a:spcPts val="0"/>
+              </a:spcBef>
+              <a:buSzPct val="25000"/>
+              <a:buNone/>
+            </a:pPr>
+            <a:r>
+              <a:rPr lang="en-US" sz="1000" b="0" i="0" u="none" strike="noStrike" cap="none" dirty="0">
+                <a:solidFill>
+                  <a:srgbClr val="FFFFFF"/>
+                </a:solidFill>
+                <a:latin typeface="Helvetica Neue"/>
+                <a:ea typeface="Helvetica Neue"/>
+                <a:cs typeface="Helvetica Neue"/>
+                <a:sym typeface="Helvetica Neue"/>
+              </a:rPr>
+              <a:t>Open </a:t>
+            </a:r>
+            <a:r>
+              <a:rPr lang="en-US" sz="1000" b="0" i="0" u="none" strike="noStrike" cap="none" dirty="0" err="1">
+                <a:solidFill>
+                  <a:srgbClr val="FFFFFF"/>
+                </a:solidFill>
+                <a:latin typeface="Helvetica Neue"/>
+                <a:ea typeface="Helvetica Neue"/>
+                <a:cs typeface="Helvetica Neue"/>
+                <a:sym typeface="Helvetica Neue"/>
+              </a:rPr>
+              <a:t>where.html</a:t>
+            </a:r>
+            <a:r>
+              <a:rPr lang="en-US" sz="1000" b="0" i="0" u="none" strike="noStrike" cap="none" dirty="0">
+                <a:solidFill>
+                  <a:srgbClr val="FFFFFF"/>
+                </a:solidFill>
+                <a:latin typeface="Helvetica Neue"/>
+                <a:ea typeface="Helvetica Neue"/>
+                <a:cs typeface="Helvetica Neue"/>
+                <a:sym typeface="Helvetica Neue"/>
+              </a:rPr>
+              <a:t> to view the data in a browser</a:t>
+            </a:r>
+            <a:endParaRPr lang="en" sz="1000" b="0" i="0" u="none" strike="noStrike" cap="none" dirty="0">
+              <a:solidFill>
+                <a:srgbClr val="FFFFFF"/>
+              </a:solidFill>
+              <a:latin typeface="Helvetica Neue"/>
+              <a:ea typeface="Helvetica Neue"/>
+              <a:cs typeface="Helvetica Neue"/>
+              <a:sym typeface="Helvetica Neue"/>
+            </a:endParaRPr>
           </a:p>
         </p:txBody>
       </p:sp>
@@ -12162,9 +12096,9 @@
         <p:grpSpPr>
           <a:xfrm>
             <a:off x="261937" y="1590570"/>
-            <a:ext cx="1613701" cy="1083469"/>
+            <a:ext cx="1645596" cy="1083469"/>
             <a:chOff x="465666" y="2827680"/>
-            <a:chExt cx="2868802" cy="1926167"/>
+            <a:chExt cx="2925504" cy="1926167"/>
           </a:xfrm>
         </p:grpSpPr>
         <p:pic>
@@ -12174,7 +12108,7 @@
             <p:nvPr/>
           </p:nvPicPr>
           <p:blipFill rotWithShape="1">
-            <a:blip r:embed="rId5">
+            <a:blip r:embed="rId4">
               <a:alphaModFix/>
             </a:blip>
             <a:srcRect/>
@@ -12202,8 +12136,8 @@
           </p:nvSpPr>
           <p:spPr>
             <a:xfrm>
-              <a:off x="1240354" y="3112888"/>
-              <a:ext cx="1745700" cy="1087500"/>
+              <a:off x="893120" y="3227456"/>
+              <a:ext cx="2498050" cy="1087500"/>
             </a:xfrm>
             <a:prstGeom prst="rect">
               <a:avLst/>
@@ -12237,7 +12171,7 @@
                 <a:buNone/>
               </a:pPr>
               <a:r>
-                <a:rPr lang="en" sz="1800" b="0" i="0" u="none" strike="noStrike" cap="none">
+                <a:rPr lang="en" sz="1800" b="0" i="0" u="none" strike="noStrike" cap="none" dirty="0">
                   <a:solidFill>
                     <a:srgbClr val="660066"/>
                   </a:solidFill>
@@ -12246,38 +12180,7 @@
                   <a:cs typeface="Helvetica Neue"/>
                   <a:sym typeface="Helvetica Neue"/>
                 </a:rPr>
-                <a:t>Google</a:t>
-              </a:r>
-            </a:p>
-            <a:p>
-              <a:pPr marL="0" marR="0" lvl="0" indent="0" algn="l" rtl="0">
-                <a:lnSpc>
-                  <a:spcPct val="100000"/>
-                </a:lnSpc>
-                <a:spcBef>
-                  <a:spcPts val="0"/>
-                </a:spcBef>
-                <a:spcAft>
-                  <a:spcPts val="0"/>
-                </a:spcAft>
-                <a:buClr>
-                  <a:srgbClr val="660066"/>
-                </a:buClr>
-                <a:buSzPct val="25000"/>
-                <a:buFont typeface="Helvetica Neue"/>
-                <a:buNone/>
-              </a:pPr>
-              <a:r>
-                <a:rPr lang="en" sz="1800" b="0" i="0" u="none" strike="noStrike" cap="none">
-                  <a:solidFill>
-                    <a:srgbClr val="660066"/>
-                  </a:solidFill>
-                  <a:latin typeface="Helvetica Neue"/>
-                  <a:ea typeface="Helvetica Neue"/>
-                  <a:cs typeface="Helvetica Neue"/>
-                  <a:sym typeface="Helvetica Neue"/>
-                </a:rPr>
-                <a:t>geodata</a:t>
+                <a:t>Open Street Map data</a:t>
               </a:r>
             </a:p>
           </p:txBody>
@@ -12528,15 +12431,16 @@
         <p:nvCxnSpPr>
           <p:cNvPr id="181" name="Shape 181"/>
           <p:cNvCxnSpPr>
+            <a:cxnSpLocks/>
             <a:stCxn id="178" idx="4"/>
-            <a:endCxn id="166" idx="1"/>
+            <a:endCxn id="3" idx="1"/>
           </p:cNvCxnSpPr>
           <p:nvPr/>
         </p:nvCxnSpPr>
         <p:spPr>
-          <a:xfrm rot="10800000" flipH="1">
-            <a:off x="6700569" y="2235241"/>
-            <a:ext cx="419400" cy="203700"/>
+          <a:xfrm flipV="1">
+            <a:off x="6700569" y="2214147"/>
+            <a:ext cx="419400" cy="224794"/>
           </a:xfrm>
           <a:prstGeom prst="straightConnector1">
             <a:avLst/>
@@ -12557,15 +12461,16 @@
         <p:nvCxnSpPr>
           <p:cNvPr id="182" name="Shape 182"/>
           <p:cNvCxnSpPr>
+            <a:cxnSpLocks/>
             <a:stCxn id="179" idx="3"/>
-            <a:endCxn id="166" idx="0"/>
+            <a:endCxn id="3" idx="0"/>
           </p:cNvCxnSpPr>
           <p:nvPr/>
         </p:nvCxnSpPr>
         <p:spPr>
-          <a:xfrm>
-            <a:off x="8048520" y="1012461"/>
-            <a:ext cx="0" cy="555000"/>
+          <a:xfrm flipH="1">
+            <a:off x="7971824" y="1012460"/>
+            <a:ext cx="76695" cy="567605"/>
           </a:xfrm>
           <a:prstGeom prst="straightConnector1">
             <a:avLst/>
@@ -12590,8 +12495,8 @@
         </p:nvSpPr>
         <p:spPr>
           <a:xfrm>
-            <a:off x="5132195" y="4574897"/>
-            <a:ext cx="3717348" cy="282769"/>
+            <a:off x="4778734" y="4574897"/>
+            <a:ext cx="4070809" cy="282769"/>
           </a:xfrm>
           <a:prstGeom prst="rect">
             <a:avLst/>
@@ -12624,10 +12529,10 @@
                 <a:cs typeface="Helvetica Neue"/>
                 <a:sym typeface="Helvetica Neue"/>
               </a:rPr>
-              <a:t>http://</a:t>
-            </a:r>
-            <a:r>
-              <a:rPr lang="en" sz="2300" b="0" i="0" u="none" strike="noStrike" cap="none" baseline="30000" dirty="0" smtClean="0">
+              <a:t>http://www.py4e.com/code3/</a:t>
+            </a:r>
+            <a:r>
+              <a:rPr lang="en" sz="2300" b="0" i="0" u="none" strike="noStrike" cap="none" baseline="30000" dirty="0" err="1">
                 <a:solidFill>
                   <a:srgbClr val="FFFF00"/>
                 </a:solidFill>
@@ -12636,19 +12541,7 @@
                 <a:cs typeface="Helvetica Neue"/>
                 <a:sym typeface="Helvetica Neue"/>
               </a:rPr>
-              <a:t>www.py4e.com/code3/</a:t>
-            </a:r>
-            <a:r>
-              <a:rPr lang="en" sz="2300" b="0" i="0" u="none" strike="noStrike" cap="none" baseline="30000" dirty="0" err="1" smtClean="0">
-                <a:solidFill>
-                  <a:srgbClr val="FFFF00"/>
-                </a:solidFill>
-                <a:latin typeface="Helvetica Neue"/>
-                <a:ea typeface="Helvetica Neue"/>
-                <a:cs typeface="Helvetica Neue"/>
-                <a:sym typeface="Helvetica Neue"/>
-              </a:rPr>
-              <a:t>geodata.zip</a:t>
+              <a:t>opengeo.zip</a:t>
             </a:r>
             <a:endParaRPr lang="en" sz="2300" b="0" i="0" u="none" strike="noStrike" cap="none" baseline="30000" dirty="0">
               <a:solidFill>
@@ -12662,18 +12555,40 @@
           </a:p>
         </p:txBody>
       </p:sp>
+      <p:pic>
+        <p:nvPicPr>
+          <p:cNvPr id="3" name="Picture 2" descr="A map of europe with red pins&#10;&#10;Description automatically generated">
+            <a:extLst>
+              <a:ext uri="{FF2B5EF4-FFF2-40B4-BE49-F238E27FC236}">
+                <a16:creationId xmlns:a16="http://schemas.microsoft.com/office/drawing/2014/main" id="{42DD948A-D9A2-9CC6-C445-17B62B718374}"/>
+              </a:ext>
+            </a:extLst>
+          </p:cNvPr>
+          <p:cNvPicPr>
+            <a:picLocks noChangeAspect="1"/>
+          </p:cNvPicPr>
+          <p:nvPr/>
+        </p:nvPicPr>
+        <p:blipFill rotWithShape="1">
+          <a:blip r:embed="rId5"/>
+          <a:srcRect r="32144"/>
+          <a:stretch/>
+        </p:blipFill>
+        <p:spPr>
+          <a:xfrm>
+            <a:off x="7119969" y="1580065"/>
+            <a:ext cx="1703709" cy="1268164"/>
+          </a:xfrm>
+          <a:prstGeom prst="rect">
+            <a:avLst/>
+          </a:prstGeom>
+        </p:spPr>
+      </p:pic>
     </p:spTree>
   </p:cSld>
   <p:clrMapOvr>
     <a:masterClrMapping/>
   </p:clrMapOvr>
-  <p:timing>
-    <p:tnLst>
-      <p:par>
-        <p:cTn xmlns:p14="http://schemas.microsoft.com/office/powerpoint/2010/main" id="1" dur="indefinite" restart="never" nodeType="tmRoot"/>
-      </p:par>
-    </p:tnLst>
-  </p:timing>
 </p:sld>
 </file>
 
@@ -12886,22 +12801,10 @@
                 <a:cs typeface="Helvetica Neue"/>
                 <a:sym typeface="Helvetica Neue"/>
               </a:rPr>
-              <a:t>http://</a:t>
-            </a:r>
-            <a:r>
-              <a:rPr lang="en" sz="2300" b="0" i="0" u="none" strike="noStrike" cap="none" baseline="30000" dirty="0" smtClean="0">
-                <a:solidFill>
-                  <a:srgbClr val="FFFF00"/>
-                </a:solidFill>
-                <a:latin typeface="Helvetica Neue"/>
-                <a:ea typeface="Helvetica Neue"/>
-                <a:cs typeface="Helvetica Neue"/>
-                <a:sym typeface="Helvetica Neue"/>
-              </a:rPr>
-              <a:t>www.py4e.com/code3/</a:t>
-            </a:r>
-            <a:r>
-              <a:rPr lang="en" sz="2300" b="0" i="0" u="none" strike="noStrike" cap="none" baseline="30000" dirty="0" err="1" smtClean="0">
+              <a:t>http://www.py4e.com/code3/</a:t>
+            </a:r>
+            <a:r>
+              <a:rPr lang="en" sz="2300" b="0" i="0" u="none" strike="noStrike" cap="none" baseline="30000" dirty="0" err="1">
                 <a:solidFill>
                   <a:srgbClr val="FFFF00"/>
                 </a:solidFill>
@@ -12956,13 +12859,6 @@
   <p:clrMapOvr>
     <a:masterClrMapping/>
   </p:clrMapOvr>
-  <p:timing>
-    <p:tnLst>
-      <p:par>
-        <p:cTn xmlns:p14="http://schemas.microsoft.com/office/powerpoint/2010/main" id="1" dur="indefinite" restart="never" nodeType="tmRoot"/>
-      </p:par>
-    </p:tnLst>
-  </p:timing>
 </p:sld>
 </file>
 
@@ -13244,13 +13140,6 @@
   <p:clrMapOvr>
     <a:masterClrMapping/>
   </p:clrMapOvr>
-  <p:timing>
-    <p:tnLst>
-      <p:par>
-        <p:cTn xmlns:p14="http://schemas.microsoft.com/office/powerpoint/2010/main" id="1" dur="indefinite" restart="never" nodeType="tmRoot"/>
-      </p:par>
-    </p:tnLst>
-  </p:timing>
 </p:sld>
 </file>
 
@@ -13417,13 +13306,6 @@
   <p:clrMapOvr>
     <a:masterClrMapping/>
   </p:clrMapOvr>
-  <p:timing>
-    <p:tnLst>
-      <p:par>
-        <p:cTn xmlns:p14="http://schemas.microsoft.com/office/powerpoint/2010/main" id="1" dur="indefinite" restart="never" nodeType="tmRoot"/>
-      </p:par>
-    </p:tnLst>
-  </p:timing>
 </p:sld>
 </file>
 

</xml_diff>